<commit_message>
Reflection day - complete
</commit_message>
<xml_diff>
--- a/Reflection/Reflection.pptx
+++ b/Reflection/Reflection.pptx
@@ -127,7 +127,7 @@
   </p:defaultTextStyle>
   <p:extLst>
     <p:ext uri="{EFAFB233-063F-42B5-8137-9DF3F51BA10A}">
-      <p15:sldGuideLst xmlns:p15="http://schemas.microsoft.com/office/powerpoint/2012/main">
+      <p15:sldGuideLst xmlns="" xmlns:p15="http://schemas.microsoft.com/office/powerpoint/2012/main">
         <p15:guide id="1" orient="horz" pos="2160">
           <p15:clr>
             <a:srgbClr val="A4A3A4"/>
@@ -232,7 +232,7 @@
             <a:fld id="{4F94E7C4-328C-457B-8CA2-EE381C323794}" type="datetimeFigureOut">
               <a:rPr lang="en-US" smtClean="0"/>
               <a:pPr/>
-              <a:t>6/28/2016</a:t>
+              <a:t>4/27/2015</a:t>
             </a:fld>
             <a:endParaRPr lang="en-US"/>
           </a:p>
@@ -401,7 +401,7 @@
     </p:spTree>
     <p:extLst>
       <p:ext uri="{BB962C8B-B14F-4D97-AF65-F5344CB8AC3E}">
-        <p14:creationId xmlns:p14="http://schemas.microsoft.com/office/powerpoint/2010/main" val="3808186854"/>
+        <p14:creationId xmlns="" xmlns:p14="http://schemas.microsoft.com/office/powerpoint/2010/main" val="3808186854"/>
       </p:ext>
     </p:extLst>
   </p:cSld>
@@ -501,285 +501,6 @@
 </p:notesMaster>
 </file>
 
-<file path=ppt/notesSlides/notesSlide1.xml><?xml version="1.0" encoding="utf-8"?>
-<p:notes xmlns:a="http://schemas.openxmlformats.org/drawingml/2006/main" xmlns:r="http://schemas.openxmlformats.org/officeDocument/2006/relationships" xmlns:p="http://schemas.openxmlformats.org/presentationml/2006/main">
-  <p:cSld>
-    <p:spTree>
-      <p:nvGrpSpPr>
-        <p:cNvPr id="1" name=""/>
-        <p:cNvGrpSpPr/>
-        <p:nvPr/>
-      </p:nvGrpSpPr>
-      <p:grpSpPr>
-        <a:xfrm>
-          <a:off x="0" y="0"/>
-          <a:ext cx="0" cy="0"/>
-          <a:chOff x="0" y="0"/>
-          <a:chExt cx="0" cy="0"/>
-        </a:xfrm>
-      </p:grpSpPr>
-      <p:sp>
-        <p:nvSpPr>
-          <p:cNvPr id="2" name="Slide Image Placeholder 1"/>
-          <p:cNvSpPr>
-            <a:spLocks noGrp="1" noRot="1" noChangeAspect="1"/>
-          </p:cNvSpPr>
-          <p:nvPr>
-            <p:ph type="sldImg"/>
-          </p:nvPr>
-        </p:nvSpPr>
-        <p:spPr/>
-      </p:sp>
-      <p:sp>
-        <p:nvSpPr>
-          <p:cNvPr id="3" name="Notes Placeholder 2"/>
-          <p:cNvSpPr>
-            <a:spLocks noGrp="1"/>
-          </p:cNvSpPr>
-          <p:nvPr>
-            <p:ph type="body" idx="1"/>
-          </p:nvPr>
-        </p:nvSpPr>
-        <p:spPr/>
-        <p:txBody>
-          <a:bodyPr/>
-          <a:lstStyle/>
-          <a:p>
-            <a:r>
-              <a:rPr lang="ro-RO" dirty="0" smtClean="0"/>
-              <a:t>JVM – este o masina</a:t>
-            </a:r>
-            <a:r>
-              <a:rPr lang="ro-RO" baseline="0" dirty="0" smtClean="0"/>
-              <a:t> virtuala pe care poti rula cod java;</a:t>
-            </a:r>
-            <a:endParaRPr lang="en-US" dirty="0"/>
-          </a:p>
-        </p:txBody>
-      </p:sp>
-      <p:sp>
-        <p:nvSpPr>
-          <p:cNvPr id="4" name="Slide Number Placeholder 3"/>
-          <p:cNvSpPr>
-            <a:spLocks noGrp="1"/>
-          </p:cNvSpPr>
-          <p:nvPr>
-            <p:ph type="sldNum" sz="quarter" idx="10"/>
-          </p:nvPr>
-        </p:nvSpPr>
-        <p:spPr/>
-        <p:txBody>
-          <a:bodyPr/>
-          <a:lstStyle/>
-          <a:p>
-            <a:fld id="{84377D70-F193-4353-836F-31B604DF4B77}" type="slidenum">
-              <a:rPr lang="en-US" smtClean="0"/>
-              <a:pPr/>
-              <a:t>4</a:t>
-            </a:fld>
-            <a:endParaRPr lang="en-US"/>
-          </a:p>
-        </p:txBody>
-      </p:sp>
-    </p:spTree>
-    <p:extLst>
-      <p:ext uri="{BB962C8B-B14F-4D97-AF65-F5344CB8AC3E}">
-        <p14:creationId xmlns:p14="http://schemas.microsoft.com/office/powerpoint/2010/main" val="3951170673"/>
-      </p:ext>
-    </p:extLst>
-  </p:cSld>
-  <p:clrMapOvr>
-    <a:masterClrMapping/>
-  </p:clrMapOvr>
-</p:notes>
-</file>
-
-<file path=ppt/notesSlides/notesSlide2.xml><?xml version="1.0" encoding="utf-8"?>
-<p:notes xmlns:a="http://schemas.openxmlformats.org/drawingml/2006/main" xmlns:r="http://schemas.openxmlformats.org/officeDocument/2006/relationships" xmlns:p="http://schemas.openxmlformats.org/presentationml/2006/main">
-  <p:cSld>
-    <p:spTree>
-      <p:nvGrpSpPr>
-        <p:cNvPr id="1" name=""/>
-        <p:cNvGrpSpPr/>
-        <p:nvPr/>
-      </p:nvGrpSpPr>
-      <p:grpSpPr>
-        <a:xfrm>
-          <a:off x="0" y="0"/>
-          <a:ext cx="0" cy="0"/>
-          <a:chOff x="0" y="0"/>
-          <a:chExt cx="0" cy="0"/>
-        </a:xfrm>
-      </p:grpSpPr>
-      <p:sp>
-        <p:nvSpPr>
-          <p:cNvPr id="2" name="Slide Image Placeholder 1"/>
-          <p:cNvSpPr>
-            <a:spLocks noGrp="1" noRot="1" noChangeAspect="1"/>
-          </p:cNvSpPr>
-          <p:nvPr>
-            <p:ph type="sldImg"/>
-          </p:nvPr>
-        </p:nvSpPr>
-        <p:spPr/>
-      </p:sp>
-      <p:sp>
-        <p:nvSpPr>
-          <p:cNvPr id="3" name="Notes Placeholder 2"/>
-          <p:cNvSpPr>
-            <a:spLocks noGrp="1"/>
-          </p:cNvSpPr>
-          <p:nvPr>
-            <p:ph type="body" idx="1"/>
-          </p:nvPr>
-        </p:nvSpPr>
-        <p:spPr/>
-        <p:txBody>
-          <a:bodyPr/>
-          <a:lstStyle/>
-          <a:p>
-            <a:r>
-              <a:rPr lang="ro-RO" dirty="0" smtClean="0"/>
-              <a:t>Framework-uri</a:t>
-            </a:r>
-            <a:r>
-              <a:rPr lang="ro-RO" baseline="0" dirty="0" smtClean="0"/>
-              <a:t> care folosesc reflection: Junit;</a:t>
-            </a:r>
-            <a:endParaRPr lang="en-US" dirty="0"/>
-          </a:p>
-        </p:txBody>
-      </p:sp>
-      <p:sp>
-        <p:nvSpPr>
-          <p:cNvPr id="4" name="Slide Number Placeholder 3"/>
-          <p:cNvSpPr>
-            <a:spLocks noGrp="1"/>
-          </p:cNvSpPr>
-          <p:nvPr>
-            <p:ph type="sldNum" sz="quarter" idx="10"/>
-          </p:nvPr>
-        </p:nvSpPr>
-        <p:spPr/>
-        <p:txBody>
-          <a:bodyPr/>
-          <a:lstStyle/>
-          <a:p>
-            <a:fld id="{84377D70-F193-4353-836F-31B604DF4B77}" type="slidenum">
-              <a:rPr lang="en-US" smtClean="0"/>
-              <a:pPr/>
-              <a:t>5</a:t>
-            </a:fld>
-            <a:endParaRPr lang="en-US"/>
-          </a:p>
-        </p:txBody>
-      </p:sp>
-    </p:spTree>
-    <p:extLst>
-      <p:ext uri="{BB962C8B-B14F-4D97-AF65-F5344CB8AC3E}">
-        <p14:creationId xmlns:p14="http://schemas.microsoft.com/office/powerpoint/2010/main" val="1859322926"/>
-      </p:ext>
-    </p:extLst>
-  </p:cSld>
-  <p:clrMapOvr>
-    <a:masterClrMapping/>
-  </p:clrMapOvr>
-</p:notes>
-</file>
-
-<file path=ppt/notesSlides/notesSlide3.xml><?xml version="1.0" encoding="utf-8"?>
-<p:notes xmlns:a="http://schemas.openxmlformats.org/drawingml/2006/main" xmlns:r="http://schemas.openxmlformats.org/officeDocument/2006/relationships" xmlns:p="http://schemas.openxmlformats.org/presentationml/2006/main">
-  <p:cSld>
-    <p:spTree>
-      <p:nvGrpSpPr>
-        <p:cNvPr id="1" name=""/>
-        <p:cNvGrpSpPr/>
-        <p:nvPr/>
-      </p:nvGrpSpPr>
-      <p:grpSpPr>
-        <a:xfrm>
-          <a:off x="0" y="0"/>
-          <a:ext cx="0" cy="0"/>
-          <a:chOff x="0" y="0"/>
-          <a:chExt cx="0" cy="0"/>
-        </a:xfrm>
-      </p:grpSpPr>
-      <p:sp>
-        <p:nvSpPr>
-          <p:cNvPr id="2" name="Slide Image Placeholder 1"/>
-          <p:cNvSpPr>
-            <a:spLocks noGrp="1" noRot="1" noChangeAspect="1"/>
-          </p:cNvSpPr>
-          <p:nvPr>
-            <p:ph type="sldImg"/>
-          </p:nvPr>
-        </p:nvSpPr>
-        <p:spPr/>
-      </p:sp>
-      <p:sp>
-        <p:nvSpPr>
-          <p:cNvPr id="3" name="Notes Placeholder 2"/>
-          <p:cNvSpPr>
-            <a:spLocks noGrp="1"/>
-          </p:cNvSpPr>
-          <p:nvPr>
-            <p:ph type="body" idx="1"/>
-          </p:nvPr>
-        </p:nvSpPr>
-        <p:spPr/>
-        <p:txBody>
-          <a:bodyPr/>
-          <a:lstStyle/>
-          <a:p>
-            <a:r>
-              <a:rPr lang="ro-RO" dirty="0" smtClean="0"/>
-              <a:t>Security restriction:</a:t>
-            </a:r>
-            <a:r>
-              <a:rPr lang="ro-RO" baseline="0" dirty="0" smtClean="0"/>
-              <a:t> poti sa setezi in jvm restrictii de read only, in felul acesta nu mai poti sa folosesti reflection.</a:t>
-            </a:r>
-            <a:endParaRPr lang="en-US" dirty="0"/>
-          </a:p>
-        </p:txBody>
-      </p:sp>
-      <p:sp>
-        <p:nvSpPr>
-          <p:cNvPr id="4" name="Slide Number Placeholder 3"/>
-          <p:cNvSpPr>
-            <a:spLocks noGrp="1"/>
-          </p:cNvSpPr>
-          <p:nvPr>
-            <p:ph type="sldNum" sz="quarter" idx="10"/>
-          </p:nvPr>
-        </p:nvSpPr>
-        <p:spPr/>
-        <p:txBody>
-          <a:bodyPr/>
-          <a:lstStyle/>
-          <a:p>
-            <a:fld id="{84377D70-F193-4353-836F-31B604DF4B77}" type="slidenum">
-              <a:rPr lang="en-US" smtClean="0"/>
-              <a:pPr/>
-              <a:t>6</a:t>
-            </a:fld>
-            <a:endParaRPr lang="en-US"/>
-          </a:p>
-        </p:txBody>
-      </p:sp>
-    </p:spTree>
-    <p:extLst>
-      <p:ext uri="{BB962C8B-B14F-4D97-AF65-F5344CB8AC3E}">
-        <p14:creationId xmlns:p14="http://schemas.microsoft.com/office/powerpoint/2010/main" val="52043774"/>
-      </p:ext>
-    </p:extLst>
-  </p:cSld>
-  <p:clrMapOvr>
-    <a:masterClrMapping/>
-  </p:clrMapOvr>
-</p:notes>
-</file>
-
 <file path=ppt/slideLayouts/slideLayout1.xml><?xml version="1.0" encoding="utf-8"?>
 <p:sldLayout xmlns:a="http://schemas.openxmlformats.org/drawingml/2006/main" xmlns:r="http://schemas.openxmlformats.org/officeDocument/2006/relationships" xmlns:p="http://schemas.openxmlformats.org/presentationml/2006/main" preserve="1" userDrawn="1">
   <p:cSld name="Titlu">
@@ -809,7 +530,7 @@
           <a:blip r:embed="rId2">
             <a:extLst>
               <a:ext uri="{28A0092B-C50C-407E-A947-70E740481C1C}">
-                <a14:useLocalDpi xmlns:a14="http://schemas.microsoft.com/office/drawing/2010/main" val="0"/>
+                <a14:useLocalDpi xmlns="" xmlns:a14="http://schemas.microsoft.com/office/drawing/2010/main" val="0"/>
               </a:ext>
             </a:extLst>
           </a:blip>
@@ -877,7 +598,7 @@
           <a:blip r:embed="rId3">
             <a:extLst>
               <a:ext uri="{28A0092B-C50C-407E-A947-70E740481C1C}">
-                <a14:useLocalDpi xmlns:a14="http://schemas.microsoft.com/office/drawing/2010/main" val="0"/>
+                <a14:useLocalDpi xmlns="" xmlns:a14="http://schemas.microsoft.com/office/drawing/2010/main" val="0"/>
               </a:ext>
             </a:extLst>
           </a:blip>
@@ -898,7 +619,7 @@
     </p:spTree>
     <p:extLst>
       <p:ext uri="{BB962C8B-B14F-4D97-AF65-F5344CB8AC3E}">
-        <p14:creationId xmlns:p14="http://schemas.microsoft.com/office/powerpoint/2010/main" val="1862066825"/>
+        <p14:creationId xmlns="" xmlns:p14="http://schemas.microsoft.com/office/powerpoint/2010/main" val="1862066825"/>
       </p:ext>
     </p:extLst>
   </p:cSld>
@@ -937,7 +658,7 @@
           <a:blip r:embed="rId2">
             <a:extLst>
               <a:ext uri="{28A0092B-C50C-407E-A947-70E740481C1C}">
-                <a14:useLocalDpi xmlns:a14="http://schemas.microsoft.com/office/drawing/2010/main" val="0"/>
+                <a14:useLocalDpi xmlns="" xmlns:a14="http://schemas.microsoft.com/office/drawing/2010/main" val="0"/>
               </a:ext>
             </a:extLst>
           </a:blip>
@@ -1005,7 +726,7 @@
           <a:blip r:embed="rId3">
             <a:extLst>
               <a:ext uri="{28A0092B-C50C-407E-A947-70E740481C1C}">
-                <a14:useLocalDpi xmlns:a14="http://schemas.microsoft.com/office/drawing/2010/main" val="0"/>
+                <a14:useLocalDpi xmlns="" xmlns:a14="http://schemas.microsoft.com/office/drawing/2010/main" val="0"/>
               </a:ext>
             </a:extLst>
           </a:blip>
@@ -1145,7 +866,7 @@
     </p:spTree>
     <p:extLst>
       <p:ext uri="{BB962C8B-B14F-4D97-AF65-F5344CB8AC3E}">
-        <p14:creationId xmlns:p14="http://schemas.microsoft.com/office/powerpoint/2010/main" val="60014088"/>
+        <p14:creationId xmlns="" xmlns:p14="http://schemas.microsoft.com/office/powerpoint/2010/main" val="60014088"/>
       </p:ext>
     </p:extLst>
   </p:cSld>
@@ -1184,7 +905,7 @@
           <a:blip r:embed="rId2">
             <a:extLst>
               <a:ext uri="{28A0092B-C50C-407E-A947-70E740481C1C}">
-                <a14:useLocalDpi xmlns:a14="http://schemas.microsoft.com/office/drawing/2010/main" val="0"/>
+                <a14:useLocalDpi xmlns="" xmlns:a14="http://schemas.microsoft.com/office/drawing/2010/main" val="0"/>
               </a:ext>
             </a:extLst>
           </a:blip>
@@ -1352,7 +1073,7 @@
           <a:blip r:embed="rId3">
             <a:extLst>
               <a:ext uri="{28A0092B-C50C-407E-A947-70E740481C1C}">
-                <a14:useLocalDpi xmlns:a14="http://schemas.microsoft.com/office/drawing/2010/main" val="0"/>
+                <a14:useLocalDpi xmlns="" xmlns:a14="http://schemas.microsoft.com/office/drawing/2010/main" val="0"/>
               </a:ext>
             </a:extLst>
           </a:blip>
@@ -1373,7 +1094,7 @@
     </p:spTree>
     <p:extLst>
       <p:ext uri="{BB962C8B-B14F-4D97-AF65-F5344CB8AC3E}">
-        <p14:creationId xmlns:p14="http://schemas.microsoft.com/office/powerpoint/2010/main" val="2570663212"/>
+        <p14:creationId xmlns="" xmlns:p14="http://schemas.microsoft.com/office/powerpoint/2010/main" val="2570663212"/>
       </p:ext>
     </p:extLst>
   </p:cSld>
@@ -1412,7 +1133,7 @@
           <a:blip r:embed="rId2">
             <a:extLst>
               <a:ext uri="{28A0092B-C50C-407E-A947-70E740481C1C}">
-                <a14:useLocalDpi xmlns:a14="http://schemas.microsoft.com/office/drawing/2010/main" val="0"/>
+                <a14:useLocalDpi xmlns="" xmlns:a14="http://schemas.microsoft.com/office/drawing/2010/main" val="0"/>
               </a:ext>
             </a:extLst>
           </a:blip>
@@ -1546,7 +1267,7 @@
           <a:blip r:embed="rId3">
             <a:extLst>
               <a:ext uri="{28A0092B-C50C-407E-A947-70E740481C1C}">
-                <a14:useLocalDpi xmlns:a14="http://schemas.microsoft.com/office/drawing/2010/main" val="0"/>
+                <a14:useLocalDpi xmlns="" xmlns:a14="http://schemas.microsoft.com/office/drawing/2010/main" val="0"/>
               </a:ext>
             </a:extLst>
           </a:blip>
@@ -1567,7 +1288,7 @@
     </p:spTree>
     <p:extLst>
       <p:ext uri="{BB962C8B-B14F-4D97-AF65-F5344CB8AC3E}">
-        <p14:creationId xmlns:p14="http://schemas.microsoft.com/office/powerpoint/2010/main" val="150044434"/>
+        <p14:creationId xmlns="" xmlns:p14="http://schemas.microsoft.com/office/powerpoint/2010/main" val="150044434"/>
       </p:ext>
     </p:extLst>
   </p:cSld>
@@ -1606,7 +1327,7 @@
           <a:blip r:embed="rId2">
             <a:extLst>
               <a:ext uri="{28A0092B-C50C-407E-A947-70E740481C1C}">
-                <a14:useLocalDpi xmlns:a14="http://schemas.microsoft.com/office/drawing/2010/main" val="0"/>
+                <a14:useLocalDpi xmlns="" xmlns:a14="http://schemas.microsoft.com/office/drawing/2010/main" val="0"/>
               </a:ext>
             </a:extLst>
           </a:blip>
@@ -1793,7 +1514,7 @@
     </p:spTree>
     <p:extLst>
       <p:ext uri="{BB962C8B-B14F-4D97-AF65-F5344CB8AC3E}">
-        <p14:creationId xmlns:p14="http://schemas.microsoft.com/office/powerpoint/2010/main" val="3625259756"/>
+        <p14:creationId xmlns="" xmlns:p14="http://schemas.microsoft.com/office/powerpoint/2010/main" val="3625259756"/>
       </p:ext>
     </p:extLst>
   </p:cSld>
@@ -1832,7 +1553,7 @@
           <a:blip r:embed="rId2">
             <a:extLst>
               <a:ext uri="{28A0092B-C50C-407E-A947-70E740481C1C}">
-                <a14:useLocalDpi xmlns:a14="http://schemas.microsoft.com/office/drawing/2010/main" val="0"/>
+                <a14:useLocalDpi xmlns="" xmlns:a14="http://schemas.microsoft.com/office/drawing/2010/main" val="0"/>
               </a:ext>
             </a:extLst>
           </a:blip>
@@ -2149,7 +1870,7 @@
           <a:blip r:embed="rId3">
             <a:extLst>
               <a:ext uri="{28A0092B-C50C-407E-A947-70E740481C1C}">
-                <a14:useLocalDpi xmlns:a14="http://schemas.microsoft.com/office/drawing/2010/main" val="0"/>
+                <a14:useLocalDpi xmlns="" xmlns:a14="http://schemas.microsoft.com/office/drawing/2010/main" val="0"/>
               </a:ext>
             </a:extLst>
           </a:blip>
@@ -2170,7 +1891,7 @@
     </p:spTree>
     <p:extLst>
       <p:ext uri="{BB962C8B-B14F-4D97-AF65-F5344CB8AC3E}">
-        <p14:creationId xmlns:p14="http://schemas.microsoft.com/office/powerpoint/2010/main" val="2876717016"/>
+        <p14:creationId xmlns="" xmlns:p14="http://schemas.microsoft.com/office/powerpoint/2010/main" val="2876717016"/>
       </p:ext>
     </p:extLst>
   </p:cSld>
@@ -2209,7 +1930,7 @@
           <a:blip r:embed="rId2">
             <a:extLst>
               <a:ext uri="{28A0092B-C50C-407E-A947-70E740481C1C}">
-                <a14:useLocalDpi xmlns:a14="http://schemas.microsoft.com/office/drawing/2010/main" val="0"/>
+                <a14:useLocalDpi xmlns="" xmlns:a14="http://schemas.microsoft.com/office/drawing/2010/main" val="0"/>
               </a:ext>
             </a:extLst>
           </a:blip>
@@ -2392,7 +2113,7 @@
           <a:blip r:embed="rId3">
             <a:extLst>
               <a:ext uri="{28A0092B-C50C-407E-A947-70E740481C1C}">
-                <a14:useLocalDpi xmlns:a14="http://schemas.microsoft.com/office/drawing/2010/main" val="0"/>
+                <a14:useLocalDpi xmlns="" xmlns:a14="http://schemas.microsoft.com/office/drawing/2010/main" val="0"/>
               </a:ext>
             </a:extLst>
           </a:blip>
@@ -2413,7 +2134,7 @@
     </p:spTree>
     <p:extLst>
       <p:ext uri="{BB962C8B-B14F-4D97-AF65-F5344CB8AC3E}">
-        <p14:creationId xmlns:p14="http://schemas.microsoft.com/office/powerpoint/2010/main" val="2258782695"/>
+        <p14:creationId xmlns="" xmlns:p14="http://schemas.microsoft.com/office/powerpoint/2010/main" val="2258782695"/>
       </p:ext>
     </p:extLst>
   </p:cSld>
@@ -2443,7 +2164,7 @@
     </p:spTree>
     <p:extLst>
       <p:ext uri="{BB962C8B-B14F-4D97-AF65-F5344CB8AC3E}">
-        <p14:creationId xmlns:p14="http://schemas.microsoft.com/office/powerpoint/2010/main" val="1672910916"/>
+        <p14:creationId xmlns="" xmlns:p14="http://schemas.microsoft.com/office/powerpoint/2010/main" val="1672910916"/>
       </p:ext>
     </p:extLst>
   </p:cSld>
@@ -2482,7 +2203,7 @@
           <a:blip r:embed="rId2">
             <a:extLst>
               <a:ext uri="{28A0092B-C50C-407E-A947-70E740481C1C}">
-                <a14:useLocalDpi xmlns:a14="http://schemas.microsoft.com/office/drawing/2010/main" val="0"/>
+                <a14:useLocalDpi xmlns="" xmlns:a14="http://schemas.microsoft.com/office/drawing/2010/main" val="0"/>
               </a:ext>
             </a:extLst>
           </a:blip>
@@ -2550,7 +2271,7 @@
           <a:blip r:embed="rId3">
             <a:extLst>
               <a:ext uri="{28A0092B-C50C-407E-A947-70E740481C1C}">
-                <a14:useLocalDpi xmlns:a14="http://schemas.microsoft.com/office/drawing/2010/main" val="0"/>
+                <a14:useLocalDpi xmlns="" xmlns:a14="http://schemas.microsoft.com/office/drawing/2010/main" val="0"/>
               </a:ext>
             </a:extLst>
           </a:blip>
@@ -2571,7 +2292,7 @@
     </p:spTree>
     <p:extLst>
       <p:ext uri="{BB962C8B-B14F-4D97-AF65-F5344CB8AC3E}">
-        <p14:creationId xmlns:p14="http://schemas.microsoft.com/office/powerpoint/2010/main" val="2887443843"/>
+        <p14:creationId xmlns="" xmlns:p14="http://schemas.microsoft.com/office/powerpoint/2010/main" val="2887443843"/>
       </p:ext>
     </p:extLst>
   </p:cSld>
@@ -2736,7 +2457,7 @@
             <a:fld id="{0DDD1723-F08C-BC4A-A158-087EDAF93B47}" type="datetimeFigureOut">
               <a:rPr lang="en-US"/>
               <a:pPr/>
-              <a:t>6/28/2016</a:t>
+              <a:t>4/27/2015</a:t>
             </a:fld>
             <a:endParaRPr lang="en-US"/>
           </a:p>
@@ -2828,7 +2549,7 @@
     </p:spTree>
     <p:extLst>
       <p:ext uri="{BB962C8B-B14F-4D97-AF65-F5344CB8AC3E}">
-        <p14:creationId xmlns:p14="http://schemas.microsoft.com/office/powerpoint/2010/main" val="3068172585"/>
+        <p14:creationId xmlns="" xmlns:p14="http://schemas.microsoft.com/office/powerpoint/2010/main" val="3068172585"/>
       </p:ext>
     </p:extLst>
   </p:cSld>
@@ -3182,7 +2903,7 @@
     </p:spTree>
     <p:extLst>
       <p:ext uri="{BB962C8B-B14F-4D97-AF65-F5344CB8AC3E}">
-        <p14:creationId xmlns:p14="http://schemas.microsoft.com/office/powerpoint/2010/main" val="1908241380"/>
+        <p14:creationId xmlns="" xmlns:p14="http://schemas.microsoft.com/office/powerpoint/2010/main" val="1908241380"/>
       </p:ext>
     </p:extLst>
   </p:cSld>
@@ -4656,7 +4377,11 @@
           <a:p>
             <a:r>
               <a:rPr lang="en-US" sz="2800" b="1" dirty="0" smtClean="0"/>
-              <a:t>Information for the compiler</a:t>
+              <a:t>Information </a:t>
+            </a:r>
+            <a:r>
+              <a:rPr lang="en-US" sz="2800" b="1" dirty="0" smtClean="0"/>
+              <a:t>for the compiler</a:t>
             </a:r>
             <a:r>
               <a:rPr lang="en-US" sz="2800" dirty="0" smtClean="0"/>
@@ -5199,7 +4924,7 @@
     </p:spTree>
     <p:extLst>
       <p:ext uri="{BB962C8B-B14F-4D97-AF65-F5344CB8AC3E}">
-        <p14:creationId xmlns:p14="http://schemas.microsoft.com/office/powerpoint/2010/main" val="3527682676"/>
+        <p14:creationId xmlns="" xmlns:p14="http://schemas.microsoft.com/office/powerpoint/2010/main" val="3527682676"/>
       </p:ext>
     </p:extLst>
   </p:cSld>
@@ -5382,7 +5107,7 @@
     </p:spTree>
     <p:extLst>
       <p:ext uri="{BB962C8B-B14F-4D97-AF65-F5344CB8AC3E}">
-        <p14:creationId xmlns:p14="http://schemas.microsoft.com/office/powerpoint/2010/main" val="4040253284"/>
+        <p14:creationId xmlns="" xmlns:p14="http://schemas.microsoft.com/office/powerpoint/2010/main" val="4040253284"/>
       </p:ext>
     </p:extLst>
   </p:cSld>
@@ -6578,12 +6303,12 @@
 </file>
 
 <file path=customXml/item1.xml><?xml version="1.0" encoding="utf-8"?>
-<p:properties xmlns:p="http://schemas.microsoft.com/office/2006/metadata/properties" xmlns:xsi="http://www.w3.org/2001/XMLSchema-instance" xmlns:pc="http://schemas.microsoft.com/office/infopath/2007/PartnerControls">
-  <documentManagement>
-    <PublishingExpirationDate xmlns="http://schemas.microsoft.com/sharepoint/v3" xsi:nil="true"/>
-    <PublishingStartDate xmlns="http://schemas.microsoft.com/sharepoint/v3" xsi:nil="true"/>
-  </documentManagement>
-</p:properties>
+<?mso-contentType ?>
+<FormTemplates xmlns="http://schemas.microsoft.com/sharepoint/v3/contenttype/forms">
+  <Display>DocumentLibraryForm</Display>
+  <Edit>DocumentLibraryForm</Edit>
+  <New>DocumentLibraryForm</New>
+</FormTemplates>
 </file>
 
 <file path=customXml/item2.xml><?xml version="1.0" encoding="utf-8"?>
@@ -6719,20 +6444,18 @@
 </file>
 
 <file path=customXml/item3.xml><?xml version="1.0" encoding="utf-8"?>
-<?mso-contentType ?>
-<FormTemplates xmlns="http://schemas.microsoft.com/sharepoint/v3/contenttype/forms">
-  <Display>DocumentLibraryForm</Display>
-  <Edit>DocumentLibraryForm</Edit>
-  <New>DocumentLibraryForm</New>
-</FormTemplates>
+<p:properties xmlns:p="http://schemas.microsoft.com/office/2006/metadata/properties" xmlns:xsi="http://www.w3.org/2001/XMLSchema-instance" xmlns:pc="http://schemas.microsoft.com/office/infopath/2007/PartnerControls">
+  <documentManagement>
+    <PublishingExpirationDate xmlns="http://schemas.microsoft.com/sharepoint/v3" xsi:nil="true"/>
+    <PublishingStartDate xmlns="http://schemas.microsoft.com/sharepoint/v3" xsi:nil="true"/>
+  </documentManagement>
+</p:properties>
 </file>
 
 <file path=customXml/itemProps1.xml><?xml version="1.0" encoding="utf-8"?>
-<ds:datastoreItem xmlns:ds="http://schemas.openxmlformats.org/officeDocument/2006/customXml" ds:itemID="{C1424CC9-255C-4972-B5F2-6F19B32F3DEA}">
+<ds:datastoreItem xmlns:ds="http://schemas.openxmlformats.org/officeDocument/2006/customXml" ds:itemID="{B3E8851E-A513-4DE1-BFEA-60B7444A3522}">
   <ds:schemaRefs>
-    <ds:schemaRef ds:uri="http://schemas.microsoft.com/office/2006/metadata/properties"/>
-    <ds:schemaRef ds:uri="http://schemas.microsoft.com/office/infopath/2007/PartnerControls"/>
-    <ds:schemaRef ds:uri="http://schemas.microsoft.com/sharepoint/v3"/>
+    <ds:schemaRef ds:uri="http://schemas.microsoft.com/sharepoint/v3/contenttype/forms"/>
   </ds:schemaRefs>
 </ds:datastoreItem>
 </file>
@@ -6756,9 +6479,11 @@
 </file>
 
 <file path=customXml/itemProps3.xml><?xml version="1.0" encoding="utf-8"?>
-<ds:datastoreItem xmlns:ds="http://schemas.openxmlformats.org/officeDocument/2006/customXml" ds:itemID="{B3E8851E-A513-4DE1-BFEA-60B7444A3522}">
+<ds:datastoreItem xmlns:ds="http://schemas.openxmlformats.org/officeDocument/2006/customXml" ds:itemID="{C1424CC9-255C-4972-B5F2-6F19B32F3DEA}">
   <ds:schemaRefs>
-    <ds:schemaRef ds:uri="http://schemas.microsoft.com/sharepoint/v3/contenttype/forms"/>
+    <ds:schemaRef ds:uri="http://schemas.microsoft.com/office/2006/metadata/properties"/>
+    <ds:schemaRef ds:uri="http://schemas.microsoft.com/office/infopath/2007/PartnerControls"/>
+    <ds:schemaRef ds:uri="http://schemas.microsoft.com/sharepoint/v3"/>
   </ds:schemaRefs>
 </ds:datastoreItem>
 </file>
</xml_diff>